<commit_message>
Updated flow diagram based on our discussion
git-svn-id: http://gforge.soe.ucsc.edu/svn/scheduling115/trunk@31 24d622c1-b139-487c-8c47-8fc189a5de26
</commit_message>
<xml_diff>
--- a/docs/Flow diagram.pptx
+++ b/docs/Flow diagram.pptx
@@ -286,10 +286,9 @@
           <a:bodyPr/>
           <a:lstStyle/>
           <a:p>
-            <a:fld id="{6E78224E-B441-47F1-A036-58C67EA5E872}" type="datetimeFigureOut">
-              <a:rPr lang="en-US" smtClean="0"/>
-              <a:pPr/>
-              <a:t>10/3/2010</a:t>
+            <a:fld id="{37B5A10D-57DA-4CA5-AEBB-C50A90A5B500}" type="datetimeFigureOut">
+              <a:rPr lang="en-US" smtClean="0"/>
+              <a:t>10/7/2010</a:t>
             </a:fld>
             <a:endParaRPr lang="en-US"/>
           </a:p>
@@ -329,9 +328,8 @@
           <a:bodyPr/>
           <a:lstStyle/>
           <a:p>
-            <a:fld id="{A9E581C5-9F54-409C-86A2-3C53A0CBB351}" type="slidenum">
-              <a:rPr lang="en-US" smtClean="0"/>
-              <a:pPr/>
+            <a:fld id="{8235540F-2327-4DDF-B3E5-8DD53EE4541A}" type="slidenum">
+              <a:rPr lang="en-US" smtClean="0"/>
               <a:t>‹#›</a:t>
             </a:fld>
             <a:endParaRPr lang="en-US"/>
@@ -453,10 +451,9 @@
           <a:bodyPr/>
           <a:lstStyle/>
           <a:p>
-            <a:fld id="{6E78224E-B441-47F1-A036-58C67EA5E872}" type="datetimeFigureOut">
-              <a:rPr lang="en-US" smtClean="0"/>
-              <a:pPr/>
-              <a:t>10/3/2010</a:t>
+            <a:fld id="{37B5A10D-57DA-4CA5-AEBB-C50A90A5B500}" type="datetimeFigureOut">
+              <a:rPr lang="en-US" smtClean="0"/>
+              <a:t>10/7/2010</a:t>
             </a:fld>
             <a:endParaRPr lang="en-US"/>
           </a:p>
@@ -496,9 +493,8 @@
           <a:bodyPr/>
           <a:lstStyle/>
           <a:p>
-            <a:fld id="{A9E581C5-9F54-409C-86A2-3C53A0CBB351}" type="slidenum">
-              <a:rPr lang="en-US" smtClean="0"/>
-              <a:pPr/>
+            <a:fld id="{8235540F-2327-4DDF-B3E5-8DD53EE4541A}" type="slidenum">
+              <a:rPr lang="en-US" smtClean="0"/>
               <a:t>‹#›</a:t>
             </a:fld>
             <a:endParaRPr lang="en-US"/>
@@ -630,10 +626,9 @@
           <a:bodyPr/>
           <a:lstStyle/>
           <a:p>
-            <a:fld id="{6E78224E-B441-47F1-A036-58C67EA5E872}" type="datetimeFigureOut">
-              <a:rPr lang="en-US" smtClean="0"/>
-              <a:pPr/>
-              <a:t>10/3/2010</a:t>
+            <a:fld id="{37B5A10D-57DA-4CA5-AEBB-C50A90A5B500}" type="datetimeFigureOut">
+              <a:rPr lang="en-US" smtClean="0"/>
+              <a:t>10/7/2010</a:t>
             </a:fld>
             <a:endParaRPr lang="en-US"/>
           </a:p>
@@ -673,9 +668,8 @@
           <a:bodyPr/>
           <a:lstStyle/>
           <a:p>
-            <a:fld id="{A9E581C5-9F54-409C-86A2-3C53A0CBB351}" type="slidenum">
-              <a:rPr lang="en-US" smtClean="0"/>
-              <a:pPr/>
+            <a:fld id="{8235540F-2327-4DDF-B3E5-8DD53EE4541A}" type="slidenum">
+              <a:rPr lang="en-US" smtClean="0"/>
               <a:t>‹#›</a:t>
             </a:fld>
             <a:endParaRPr lang="en-US"/>
@@ -797,10 +791,9 @@
           <a:bodyPr/>
           <a:lstStyle/>
           <a:p>
-            <a:fld id="{6E78224E-B441-47F1-A036-58C67EA5E872}" type="datetimeFigureOut">
-              <a:rPr lang="en-US" smtClean="0"/>
-              <a:pPr/>
-              <a:t>10/3/2010</a:t>
+            <a:fld id="{37B5A10D-57DA-4CA5-AEBB-C50A90A5B500}" type="datetimeFigureOut">
+              <a:rPr lang="en-US" smtClean="0"/>
+              <a:t>10/7/2010</a:t>
             </a:fld>
             <a:endParaRPr lang="en-US"/>
           </a:p>
@@ -840,9 +833,8 @@
           <a:bodyPr/>
           <a:lstStyle/>
           <a:p>
-            <a:fld id="{A9E581C5-9F54-409C-86A2-3C53A0CBB351}" type="slidenum">
-              <a:rPr lang="en-US" smtClean="0"/>
-              <a:pPr/>
+            <a:fld id="{8235540F-2327-4DDF-B3E5-8DD53EE4541A}" type="slidenum">
+              <a:rPr lang="en-US" smtClean="0"/>
               <a:t>‹#›</a:t>
             </a:fld>
             <a:endParaRPr lang="en-US"/>
@@ -1040,10 +1032,9 @@
           <a:bodyPr/>
           <a:lstStyle/>
           <a:p>
-            <a:fld id="{6E78224E-B441-47F1-A036-58C67EA5E872}" type="datetimeFigureOut">
-              <a:rPr lang="en-US" smtClean="0"/>
-              <a:pPr/>
-              <a:t>10/3/2010</a:t>
+            <a:fld id="{37B5A10D-57DA-4CA5-AEBB-C50A90A5B500}" type="datetimeFigureOut">
+              <a:rPr lang="en-US" smtClean="0"/>
+              <a:t>10/7/2010</a:t>
             </a:fld>
             <a:endParaRPr lang="en-US"/>
           </a:p>
@@ -1083,9 +1074,8 @@
           <a:bodyPr/>
           <a:lstStyle/>
           <a:p>
-            <a:fld id="{A9E581C5-9F54-409C-86A2-3C53A0CBB351}" type="slidenum">
-              <a:rPr lang="en-US" smtClean="0"/>
-              <a:pPr/>
+            <a:fld id="{8235540F-2327-4DDF-B3E5-8DD53EE4541A}" type="slidenum">
+              <a:rPr lang="en-US" smtClean="0"/>
               <a:t>‹#›</a:t>
             </a:fld>
             <a:endParaRPr lang="en-US"/>
@@ -1325,10 +1315,9 @@
           <a:bodyPr/>
           <a:lstStyle/>
           <a:p>
-            <a:fld id="{6E78224E-B441-47F1-A036-58C67EA5E872}" type="datetimeFigureOut">
-              <a:rPr lang="en-US" smtClean="0"/>
-              <a:pPr/>
-              <a:t>10/3/2010</a:t>
+            <a:fld id="{37B5A10D-57DA-4CA5-AEBB-C50A90A5B500}" type="datetimeFigureOut">
+              <a:rPr lang="en-US" smtClean="0"/>
+              <a:t>10/7/2010</a:t>
             </a:fld>
             <a:endParaRPr lang="en-US"/>
           </a:p>
@@ -1368,9 +1357,8 @@
           <a:bodyPr/>
           <a:lstStyle/>
           <a:p>
-            <a:fld id="{A9E581C5-9F54-409C-86A2-3C53A0CBB351}" type="slidenum">
-              <a:rPr lang="en-US" smtClean="0"/>
-              <a:pPr/>
+            <a:fld id="{8235540F-2327-4DDF-B3E5-8DD53EE4541A}" type="slidenum">
+              <a:rPr lang="en-US" smtClean="0"/>
               <a:t>‹#›</a:t>
             </a:fld>
             <a:endParaRPr lang="en-US"/>
@@ -1744,10 +1732,9 @@
           <a:bodyPr/>
           <a:lstStyle/>
           <a:p>
-            <a:fld id="{6E78224E-B441-47F1-A036-58C67EA5E872}" type="datetimeFigureOut">
-              <a:rPr lang="en-US" smtClean="0"/>
-              <a:pPr/>
-              <a:t>10/3/2010</a:t>
+            <a:fld id="{37B5A10D-57DA-4CA5-AEBB-C50A90A5B500}" type="datetimeFigureOut">
+              <a:rPr lang="en-US" smtClean="0"/>
+              <a:t>10/7/2010</a:t>
             </a:fld>
             <a:endParaRPr lang="en-US"/>
           </a:p>
@@ -1787,9 +1774,8 @@
           <a:bodyPr/>
           <a:lstStyle/>
           <a:p>
-            <a:fld id="{A9E581C5-9F54-409C-86A2-3C53A0CBB351}" type="slidenum">
-              <a:rPr lang="en-US" smtClean="0"/>
-              <a:pPr/>
+            <a:fld id="{8235540F-2327-4DDF-B3E5-8DD53EE4541A}" type="slidenum">
+              <a:rPr lang="en-US" smtClean="0"/>
               <a:t>‹#›</a:t>
             </a:fld>
             <a:endParaRPr lang="en-US"/>
@@ -1859,10 +1845,9 @@
           <a:bodyPr/>
           <a:lstStyle/>
           <a:p>
-            <a:fld id="{6E78224E-B441-47F1-A036-58C67EA5E872}" type="datetimeFigureOut">
-              <a:rPr lang="en-US" smtClean="0"/>
-              <a:pPr/>
-              <a:t>10/3/2010</a:t>
+            <a:fld id="{37B5A10D-57DA-4CA5-AEBB-C50A90A5B500}" type="datetimeFigureOut">
+              <a:rPr lang="en-US" smtClean="0"/>
+              <a:t>10/7/2010</a:t>
             </a:fld>
             <a:endParaRPr lang="en-US"/>
           </a:p>
@@ -1902,9 +1887,8 @@
           <a:bodyPr/>
           <a:lstStyle/>
           <a:p>
-            <a:fld id="{A9E581C5-9F54-409C-86A2-3C53A0CBB351}" type="slidenum">
-              <a:rPr lang="en-US" smtClean="0"/>
-              <a:pPr/>
+            <a:fld id="{8235540F-2327-4DDF-B3E5-8DD53EE4541A}" type="slidenum">
+              <a:rPr lang="en-US" smtClean="0"/>
               <a:t>‹#›</a:t>
             </a:fld>
             <a:endParaRPr lang="en-US"/>
@@ -1951,10 +1935,9 @@
           <a:bodyPr/>
           <a:lstStyle/>
           <a:p>
-            <a:fld id="{6E78224E-B441-47F1-A036-58C67EA5E872}" type="datetimeFigureOut">
-              <a:rPr lang="en-US" smtClean="0"/>
-              <a:pPr/>
-              <a:t>10/3/2010</a:t>
+            <a:fld id="{37B5A10D-57DA-4CA5-AEBB-C50A90A5B500}" type="datetimeFigureOut">
+              <a:rPr lang="en-US" smtClean="0"/>
+              <a:t>10/7/2010</a:t>
             </a:fld>
             <a:endParaRPr lang="en-US"/>
           </a:p>
@@ -1994,9 +1977,8 @@
           <a:bodyPr/>
           <a:lstStyle/>
           <a:p>
-            <a:fld id="{A9E581C5-9F54-409C-86A2-3C53A0CBB351}" type="slidenum">
-              <a:rPr lang="en-US" smtClean="0"/>
-              <a:pPr/>
+            <a:fld id="{8235540F-2327-4DDF-B3E5-8DD53EE4541A}" type="slidenum">
+              <a:rPr lang="en-US" smtClean="0"/>
               <a:t>‹#›</a:t>
             </a:fld>
             <a:endParaRPr lang="en-US"/>
@@ -2225,10 +2207,9 @@
           <a:bodyPr/>
           <a:lstStyle/>
           <a:p>
-            <a:fld id="{6E78224E-B441-47F1-A036-58C67EA5E872}" type="datetimeFigureOut">
-              <a:rPr lang="en-US" smtClean="0"/>
-              <a:pPr/>
-              <a:t>10/3/2010</a:t>
+            <a:fld id="{37B5A10D-57DA-4CA5-AEBB-C50A90A5B500}" type="datetimeFigureOut">
+              <a:rPr lang="en-US" smtClean="0"/>
+              <a:t>10/7/2010</a:t>
             </a:fld>
             <a:endParaRPr lang="en-US"/>
           </a:p>
@@ -2268,9 +2249,8 @@
           <a:bodyPr/>
           <a:lstStyle/>
           <a:p>
-            <a:fld id="{A9E581C5-9F54-409C-86A2-3C53A0CBB351}" type="slidenum">
-              <a:rPr lang="en-US" smtClean="0"/>
-              <a:pPr/>
+            <a:fld id="{8235540F-2327-4DDF-B3E5-8DD53EE4541A}" type="slidenum">
+              <a:rPr lang="en-US" smtClean="0"/>
               <a:t>‹#›</a:t>
             </a:fld>
             <a:endParaRPr lang="en-US"/>
@@ -2475,10 +2455,9 @@
           <a:bodyPr/>
           <a:lstStyle/>
           <a:p>
-            <a:fld id="{6E78224E-B441-47F1-A036-58C67EA5E872}" type="datetimeFigureOut">
-              <a:rPr lang="en-US" smtClean="0"/>
-              <a:pPr/>
-              <a:t>10/3/2010</a:t>
+            <a:fld id="{37B5A10D-57DA-4CA5-AEBB-C50A90A5B500}" type="datetimeFigureOut">
+              <a:rPr lang="en-US" smtClean="0"/>
+              <a:t>10/7/2010</a:t>
             </a:fld>
             <a:endParaRPr lang="en-US"/>
           </a:p>
@@ -2518,9 +2497,8 @@
           <a:bodyPr/>
           <a:lstStyle/>
           <a:p>
-            <a:fld id="{A9E581C5-9F54-409C-86A2-3C53A0CBB351}" type="slidenum">
-              <a:rPr lang="en-US" smtClean="0"/>
-              <a:pPr/>
+            <a:fld id="{8235540F-2327-4DDF-B3E5-8DD53EE4541A}" type="slidenum">
+              <a:rPr lang="en-US" smtClean="0"/>
               <a:t>‹#›</a:t>
             </a:fld>
             <a:endParaRPr lang="en-US"/>
@@ -2685,10 +2663,9 @@
             </a:lvl1pPr>
           </a:lstStyle>
           <a:p>
-            <a:fld id="{6E78224E-B441-47F1-A036-58C67EA5E872}" type="datetimeFigureOut">
-              <a:rPr lang="en-US" smtClean="0"/>
-              <a:pPr/>
-              <a:t>10/3/2010</a:t>
+            <a:fld id="{37B5A10D-57DA-4CA5-AEBB-C50A90A5B500}" type="datetimeFigureOut">
+              <a:rPr lang="en-US" smtClean="0"/>
+              <a:t>10/7/2010</a:t>
             </a:fld>
             <a:endParaRPr lang="en-US"/>
           </a:p>
@@ -2764,9 +2741,8 @@
             </a:lvl1pPr>
           </a:lstStyle>
           <a:p>
-            <a:fld id="{A9E581C5-9F54-409C-86A2-3C53A0CBB351}" type="slidenum">
-              <a:rPr lang="en-US" smtClean="0"/>
-              <a:pPr/>
+            <a:fld id="{8235540F-2327-4DDF-B3E5-8DD53EE4541A}" type="slidenum">
+              <a:rPr lang="en-US" smtClean="0"/>
               <a:t>‹#›</a:t>
             </a:fld>
             <a:endParaRPr lang="en-US"/>
@@ -3059,16 +3035,230 @@
           <a:chExt cx="0" cy="0"/>
         </a:xfrm>
       </p:grpSpPr>
-      <p:sp>
-        <p:nvSpPr>
-          <p:cNvPr id="4" name="Rounded Rectangle 3"/>
+      <p:cxnSp>
+        <p:nvCxnSpPr>
+          <p:cNvPr id="11" name="Elbow Connector 10"/>
+          <p:cNvCxnSpPr>
+            <a:stCxn id="4" idx="4"/>
+            <a:endCxn id="5" idx="0"/>
+          </p:cNvCxnSpPr>
+          <p:nvPr/>
+        </p:nvCxnSpPr>
+        <p:spPr>
+          <a:xfrm rot="16200000" flipH="1">
+            <a:off x="3276600" y="1905000"/>
+            <a:ext cx="2362200" cy="76200"/>
+          </a:xfrm>
+          <a:prstGeom prst="bentConnector3">
+            <a:avLst>
+              <a:gd name="adj1" fmla="val 50000"/>
+            </a:avLst>
+          </a:prstGeom>
+          <a:ln>
+            <a:tailEnd type="arrow"/>
+          </a:ln>
+        </p:spPr>
+        <p:style>
+          <a:lnRef idx="1">
+            <a:schemeClr val="accent1"/>
+          </a:lnRef>
+          <a:fillRef idx="0">
+            <a:schemeClr val="accent1"/>
+          </a:fillRef>
+          <a:effectRef idx="0">
+            <a:schemeClr val="accent1"/>
+          </a:effectRef>
+          <a:fontRef idx="minor">
+            <a:schemeClr val="tx1"/>
+          </a:fontRef>
+        </p:style>
+      </p:cxnSp>
+      <p:sp>
+        <p:nvSpPr>
+          <p:cNvPr id="4" name="Oval 3"/>
           <p:cNvSpPr/>
           <p:nvPr/>
         </p:nvSpPr>
         <p:spPr>
           <a:xfrm>
-            <a:off x="914400" y="914400"/>
-            <a:ext cx="1219200" cy="1066800"/>
+            <a:off x="3581400" y="152400"/>
+            <a:ext cx="1676400" cy="609600"/>
+          </a:xfrm>
+          <a:prstGeom prst="ellipse">
+            <a:avLst/>
+          </a:prstGeom>
+        </p:spPr>
+        <p:style>
+          <a:lnRef idx="2">
+            <a:schemeClr val="accent1">
+              <a:shade val="50000"/>
+            </a:schemeClr>
+          </a:lnRef>
+          <a:fillRef idx="1">
+            <a:schemeClr val="accent1"/>
+          </a:fillRef>
+          <a:effectRef idx="0">
+            <a:schemeClr val="accent1"/>
+          </a:effectRef>
+          <a:fontRef idx="minor">
+            <a:schemeClr val="lt1"/>
+          </a:fontRef>
+        </p:style>
+        <p:txBody>
+          <a:bodyPr rtlCol="0" anchor="ctr"/>
+          <a:lstStyle/>
+          <a:p>
+            <a:pPr algn="ctr"/>
+            <a:r>
+              <a:rPr lang="en-US" dirty="0" smtClean="0"/>
+              <a:t>Admin</a:t>
+            </a:r>
+            <a:endParaRPr lang="en-US" dirty="0"/>
+          </a:p>
+        </p:txBody>
+      </p:sp>
+      <p:sp>
+        <p:nvSpPr>
+          <p:cNvPr id="5" name="Oval 4"/>
+          <p:cNvSpPr/>
+          <p:nvPr/>
+        </p:nvSpPr>
+        <p:spPr>
+          <a:xfrm>
+            <a:off x="3657600" y="3124200"/>
+            <a:ext cx="1676400" cy="609600"/>
+          </a:xfrm>
+          <a:prstGeom prst="ellipse">
+            <a:avLst/>
+          </a:prstGeom>
+        </p:spPr>
+        <p:style>
+          <a:lnRef idx="2">
+            <a:schemeClr val="accent1">
+              <a:shade val="50000"/>
+            </a:schemeClr>
+          </a:lnRef>
+          <a:fillRef idx="1">
+            <a:schemeClr val="accent1"/>
+          </a:fillRef>
+          <a:effectRef idx="0">
+            <a:schemeClr val="accent1"/>
+          </a:effectRef>
+          <a:fontRef idx="minor">
+            <a:schemeClr val="lt1"/>
+          </a:fontRef>
+        </p:style>
+        <p:txBody>
+          <a:bodyPr rtlCol="0" anchor="ctr"/>
+          <a:lstStyle/>
+          <a:p>
+            <a:pPr algn="ctr"/>
+            <a:r>
+              <a:rPr lang="en-US" dirty="0" smtClean="0"/>
+              <a:t>Manager</a:t>
+            </a:r>
+            <a:endParaRPr lang="en-US" dirty="0"/>
+          </a:p>
+        </p:txBody>
+      </p:sp>
+      <p:sp>
+        <p:nvSpPr>
+          <p:cNvPr id="6" name="Oval 5"/>
+          <p:cNvSpPr/>
+          <p:nvPr/>
+        </p:nvSpPr>
+        <p:spPr>
+          <a:xfrm>
+            <a:off x="914400" y="228600"/>
+            <a:ext cx="1676400" cy="609600"/>
+          </a:xfrm>
+          <a:prstGeom prst="ellipse">
+            <a:avLst/>
+          </a:prstGeom>
+        </p:spPr>
+        <p:style>
+          <a:lnRef idx="2">
+            <a:schemeClr val="accent1">
+              <a:shade val="50000"/>
+            </a:schemeClr>
+          </a:lnRef>
+          <a:fillRef idx="1">
+            <a:schemeClr val="accent1"/>
+          </a:fillRef>
+          <a:effectRef idx="0">
+            <a:schemeClr val="accent1"/>
+          </a:effectRef>
+          <a:fontRef idx="minor">
+            <a:schemeClr val="lt1"/>
+          </a:fontRef>
+        </p:style>
+        <p:txBody>
+          <a:bodyPr rtlCol="0" anchor="ctr"/>
+          <a:lstStyle/>
+          <a:p>
+            <a:pPr algn="ctr"/>
+            <a:r>
+              <a:rPr lang="en-US" dirty="0" smtClean="0"/>
+              <a:t>Lecturer</a:t>
+            </a:r>
+            <a:endParaRPr lang="en-US" dirty="0"/>
+          </a:p>
+        </p:txBody>
+      </p:sp>
+      <p:sp>
+        <p:nvSpPr>
+          <p:cNvPr id="7" name="Oval 6"/>
+          <p:cNvSpPr/>
+          <p:nvPr/>
+        </p:nvSpPr>
+        <p:spPr>
+          <a:xfrm>
+            <a:off x="7315200" y="3429000"/>
+            <a:ext cx="1676400" cy="609600"/>
+          </a:xfrm>
+          <a:prstGeom prst="ellipse">
+            <a:avLst/>
+          </a:prstGeom>
+        </p:spPr>
+        <p:style>
+          <a:lnRef idx="2">
+            <a:schemeClr val="accent1">
+              <a:shade val="50000"/>
+            </a:schemeClr>
+          </a:lnRef>
+          <a:fillRef idx="1">
+            <a:schemeClr val="accent1"/>
+          </a:fillRef>
+          <a:effectRef idx="0">
+            <a:schemeClr val="accent1"/>
+          </a:effectRef>
+          <a:fontRef idx="minor">
+            <a:schemeClr val="lt1"/>
+          </a:fontRef>
+        </p:style>
+        <p:txBody>
+          <a:bodyPr rtlCol="0" anchor="ctr"/>
+          <a:lstStyle/>
+          <a:p>
+            <a:pPr algn="ctr"/>
+            <a:r>
+              <a:rPr lang="en-US" dirty="0" smtClean="0"/>
+              <a:t>Student</a:t>
+            </a:r>
+            <a:endParaRPr lang="en-US" dirty="0"/>
+          </a:p>
+        </p:txBody>
+      </p:sp>
+      <p:sp>
+        <p:nvSpPr>
+          <p:cNvPr id="8" name="Rounded Rectangle 7"/>
+          <p:cNvSpPr/>
+          <p:nvPr/>
+        </p:nvSpPr>
+        <p:spPr>
+          <a:xfrm>
+            <a:off x="3505200" y="990600"/>
+            <a:ext cx="1905000" cy="1447800"/>
           </a:xfrm>
           <a:prstGeom prst="roundRect">
             <a:avLst/>
@@ -3091,13 +3281,30 @@
           </a:fontRef>
         </p:style>
         <p:txBody>
-          <a:bodyPr rtlCol="0" anchor="ctr"/>
-          <a:lstStyle/>
-          <a:p>
-            <a:pPr algn="ctr"/>
+          <a:bodyPr rtlCol="0" anchor="t"/>
+          <a:lstStyle/>
+          <a:p>
             <a:r>
               <a:rPr lang="en-US" dirty="0" smtClean="0"/>
-              <a:t>Program Admin</a:t>
+              <a:t>Determines:</a:t>
+            </a:r>
+          </a:p>
+          <a:p>
+            <a:r>
+              <a:rPr lang="en-US" dirty="0" smtClean="0"/>
+              <a:t>-All courses</a:t>
+            </a:r>
+          </a:p>
+          <a:p>
+            <a:r>
+              <a:rPr lang="en-US" dirty="0" smtClean="0"/>
+              <a:t>-All classrooms</a:t>
+            </a:r>
+          </a:p>
+          <a:p>
+            <a:r>
+              <a:rPr lang="en-US" dirty="0" smtClean="0"/>
+              <a:t>-All times</a:t>
             </a:r>
             <a:endParaRPr lang="en-US" dirty="0"/>
           </a:p>
@@ -3105,14 +3312,14 @@
       </p:sp>
       <p:sp>
         <p:nvSpPr>
-          <p:cNvPr id="7" name="Rounded Rectangle 6"/>
+          <p:cNvPr id="9" name="Rounded Rectangle 8"/>
           <p:cNvSpPr/>
           <p:nvPr/>
         </p:nvSpPr>
         <p:spPr>
           <a:xfrm>
-            <a:off x="4114800" y="990600"/>
-            <a:ext cx="1219200" cy="1066800"/>
+            <a:off x="3581400" y="3886200"/>
+            <a:ext cx="1905000" cy="1143000"/>
           </a:xfrm>
           <a:prstGeom prst="roundRect">
             <a:avLst/>
@@ -3135,13 +3342,24 @@
           </a:fontRef>
         </p:style>
         <p:txBody>
-          <a:bodyPr rtlCol="0" anchor="ctr"/>
-          <a:lstStyle/>
-          <a:p>
-            <a:pPr algn="ctr"/>
+          <a:bodyPr rtlCol="0" anchor="t"/>
+          <a:lstStyle/>
+          <a:p>
             <a:r>
               <a:rPr lang="en-US" dirty="0" smtClean="0"/>
-              <a:t>Program Manager</a:t>
+              <a:t>Determines:</a:t>
+            </a:r>
+          </a:p>
+          <a:p>
+            <a:r>
+              <a:rPr lang="en-US" dirty="0" smtClean="0"/>
+              <a:t>-Which courses</a:t>
+            </a:r>
+          </a:p>
+          <a:p>
+            <a:r>
+              <a:rPr lang="en-US" dirty="0" smtClean="0"/>
+              <a:t>-Which lecturers </a:t>
             </a:r>
             <a:endParaRPr lang="en-US" dirty="0"/>
           </a:p>
@@ -3149,14 +3367,170 @@
       </p:sp>
       <p:sp>
         <p:nvSpPr>
-          <p:cNvPr id="8" name="Rounded Rectangle 7"/>
+          <p:cNvPr id="12" name="Rounded Rectangle 11"/>
           <p:cNvSpPr/>
           <p:nvPr/>
         </p:nvSpPr>
         <p:spPr>
           <a:xfrm>
-            <a:off x="914400" y="3962400"/>
-            <a:ext cx="1219200" cy="1066800"/>
+            <a:off x="1066800" y="2667000"/>
+            <a:ext cx="1371600" cy="838200"/>
+          </a:xfrm>
+          <a:prstGeom prst="roundRect">
+            <a:avLst/>
+          </a:prstGeom>
+          <a:solidFill>
+            <a:schemeClr val="accent2"/>
+          </a:solidFill>
+          <a:ln>
+            <a:solidFill>
+              <a:schemeClr val="tx1"/>
+            </a:solidFill>
+          </a:ln>
+        </p:spPr>
+        <p:style>
+          <a:lnRef idx="2">
+            <a:schemeClr val="accent1">
+              <a:shade val="50000"/>
+            </a:schemeClr>
+          </a:lnRef>
+          <a:fillRef idx="1">
+            <a:schemeClr val="accent1"/>
+          </a:fillRef>
+          <a:effectRef idx="0">
+            <a:schemeClr val="accent1"/>
+          </a:effectRef>
+          <a:fontRef idx="minor">
+            <a:schemeClr val="lt1"/>
+          </a:fontRef>
+        </p:style>
+        <p:txBody>
+          <a:bodyPr rtlCol="0" anchor="ctr"/>
+          <a:lstStyle/>
+          <a:p>
+            <a:pPr algn="ctr"/>
+            <a:r>
+              <a:rPr lang="en-US" dirty="0" smtClean="0"/>
+              <a:t>Merged DB</a:t>
+            </a:r>
+            <a:endParaRPr lang="en-US" dirty="0"/>
+          </a:p>
+        </p:txBody>
+      </p:sp>
+      <p:sp>
+        <p:nvSpPr>
+          <p:cNvPr id="13" name="Rounded Rectangle 12"/>
+          <p:cNvSpPr/>
+          <p:nvPr/>
+        </p:nvSpPr>
+        <p:spPr>
+          <a:xfrm>
+            <a:off x="5181600" y="1219200"/>
+            <a:ext cx="1371600" cy="838200"/>
+          </a:xfrm>
+          <a:prstGeom prst="roundRect">
+            <a:avLst/>
+          </a:prstGeom>
+          <a:solidFill>
+            <a:schemeClr val="accent2"/>
+          </a:solidFill>
+          <a:ln>
+            <a:solidFill>
+              <a:schemeClr val="tx1"/>
+            </a:solidFill>
+          </a:ln>
+        </p:spPr>
+        <p:style>
+          <a:lnRef idx="2">
+            <a:schemeClr val="accent1">
+              <a:shade val="50000"/>
+            </a:schemeClr>
+          </a:lnRef>
+          <a:fillRef idx="1">
+            <a:schemeClr val="accent1"/>
+          </a:fillRef>
+          <a:effectRef idx="0">
+            <a:schemeClr val="accent1"/>
+          </a:effectRef>
+          <a:fontRef idx="minor">
+            <a:schemeClr val="lt1"/>
+          </a:fontRef>
+        </p:style>
+        <p:txBody>
+          <a:bodyPr rtlCol="0" anchor="ctr"/>
+          <a:lstStyle/>
+          <a:p>
+            <a:pPr algn="ctr"/>
+            <a:r>
+              <a:rPr lang="en-US" dirty="0" smtClean="0"/>
+              <a:t>Master Course DB</a:t>
+            </a:r>
+            <a:endParaRPr lang="en-US" dirty="0"/>
+          </a:p>
+        </p:txBody>
+      </p:sp>
+      <p:sp>
+        <p:nvSpPr>
+          <p:cNvPr id="14" name="Rounded Rectangle 13"/>
+          <p:cNvSpPr/>
+          <p:nvPr/>
+        </p:nvSpPr>
+        <p:spPr>
+          <a:xfrm>
+            <a:off x="5410200" y="3962400"/>
+            <a:ext cx="1371600" cy="838200"/>
+          </a:xfrm>
+          <a:prstGeom prst="roundRect">
+            <a:avLst/>
+          </a:prstGeom>
+          <a:solidFill>
+            <a:schemeClr val="accent2"/>
+          </a:solidFill>
+          <a:ln>
+            <a:solidFill>
+              <a:schemeClr val="tx1"/>
+            </a:solidFill>
+          </a:ln>
+        </p:spPr>
+        <p:style>
+          <a:lnRef idx="2">
+            <a:schemeClr val="accent1">
+              <a:shade val="50000"/>
+            </a:schemeClr>
+          </a:lnRef>
+          <a:fillRef idx="1">
+            <a:schemeClr val="accent1"/>
+          </a:fillRef>
+          <a:effectRef idx="0">
+            <a:schemeClr val="accent1"/>
+          </a:effectRef>
+          <a:fontRef idx="minor">
+            <a:schemeClr val="lt1"/>
+          </a:fontRef>
+        </p:style>
+        <p:txBody>
+          <a:bodyPr rtlCol="0" anchor="ctr"/>
+          <a:lstStyle/>
+          <a:p>
+            <a:pPr algn="ctr"/>
+            <a:r>
+              <a:rPr lang="en-US" dirty="0" smtClean="0"/>
+              <a:t>Quarter DB</a:t>
+            </a:r>
+            <a:endParaRPr lang="en-US" dirty="0"/>
+          </a:p>
+        </p:txBody>
+      </p:sp>
+      <p:sp>
+        <p:nvSpPr>
+          <p:cNvPr id="15" name="Rounded Rectangle 14"/>
+          <p:cNvSpPr/>
+          <p:nvPr/>
+        </p:nvSpPr>
+        <p:spPr>
+          <a:xfrm>
+            <a:off x="838200" y="990600"/>
+            <a:ext cx="1905000" cy="914400"/>
           </a:xfrm>
           <a:prstGeom prst="roundRect">
             <a:avLst/>
@@ -3179,117 +3553,232 @@
           </a:fontRef>
         </p:style>
         <p:txBody>
-          <a:bodyPr rtlCol="0" anchor="ctr"/>
-          <a:lstStyle/>
-          <a:p>
-            <a:pPr algn="ctr"/>
+          <a:bodyPr rtlCol="0" anchor="t"/>
+          <a:lstStyle/>
+          <a:p>
             <a:r>
               <a:rPr lang="en-US" dirty="0" smtClean="0"/>
-              <a:t>Lecturers</a:t>
-            </a:r>
-            <a:endParaRPr lang="en-US" dirty="0"/>
-          </a:p>
-        </p:txBody>
-      </p:sp>
-      <p:sp>
-        <p:nvSpPr>
-          <p:cNvPr id="9" name="TextBox 8"/>
-          <p:cNvSpPr txBox="1"/>
+              <a:t>Determines:</a:t>
+            </a:r>
+          </a:p>
+          <a:p>
+            <a:r>
+              <a:rPr lang="en-US" dirty="0" smtClean="0"/>
+              <a:t>-Constraints</a:t>
+            </a:r>
+          </a:p>
+        </p:txBody>
+      </p:sp>
+      <p:cxnSp>
+        <p:nvCxnSpPr>
+          <p:cNvPr id="17" name="Elbow Connector 16"/>
+          <p:cNvCxnSpPr>
+            <a:stCxn id="6" idx="4"/>
+            <a:endCxn id="12" idx="0"/>
+          </p:cNvCxnSpPr>
+          <p:nvPr/>
+        </p:nvCxnSpPr>
+        <p:spPr>
+          <a:xfrm rot="5400000">
+            <a:off x="838200" y="1752600"/>
+            <a:ext cx="1828800" cy="1588"/>
+          </a:xfrm>
+          <a:prstGeom prst="bentConnector3">
+            <a:avLst>
+              <a:gd name="adj1" fmla="val 50000"/>
+            </a:avLst>
+          </a:prstGeom>
+          <a:ln>
+            <a:tailEnd type="arrow"/>
+          </a:ln>
+        </p:spPr>
+        <p:style>
+          <a:lnRef idx="1">
+            <a:schemeClr val="accent1"/>
+          </a:lnRef>
+          <a:fillRef idx="0">
+            <a:schemeClr val="accent1"/>
+          </a:fillRef>
+          <a:effectRef idx="0">
+            <a:schemeClr val="accent1"/>
+          </a:effectRef>
+          <a:fontRef idx="minor">
+            <a:schemeClr val="tx1"/>
+          </a:fontRef>
+        </p:style>
+      </p:cxnSp>
+      <p:cxnSp>
+        <p:nvCxnSpPr>
+          <p:cNvPr id="19" name="Shape 18"/>
+          <p:cNvCxnSpPr>
+            <a:stCxn id="9" idx="1"/>
+            <a:endCxn id="12" idx="2"/>
+          </p:cNvCxnSpPr>
+          <p:nvPr/>
+        </p:nvCxnSpPr>
+        <p:spPr>
+          <a:xfrm rot="10800000">
+            <a:off x="1752600" y="3505200"/>
+            <a:ext cx="1828800" cy="952500"/>
+          </a:xfrm>
+          <a:prstGeom prst="bentConnector2">
+            <a:avLst/>
+          </a:prstGeom>
+          <a:ln>
+            <a:tailEnd type="arrow"/>
+          </a:ln>
+        </p:spPr>
+        <p:style>
+          <a:lnRef idx="1">
+            <a:schemeClr val="accent1"/>
+          </a:lnRef>
+          <a:fillRef idx="0">
+            <a:schemeClr val="accent1"/>
+          </a:fillRef>
+          <a:effectRef idx="0">
+            <a:schemeClr val="accent1"/>
+          </a:effectRef>
+          <a:fontRef idx="minor">
+            <a:schemeClr val="tx1"/>
+          </a:fontRef>
+        </p:style>
+      </p:cxnSp>
+      <p:cxnSp>
+        <p:nvCxnSpPr>
+          <p:cNvPr id="21" name="Elbow Connector 20"/>
+          <p:cNvCxnSpPr>
+            <a:stCxn id="12" idx="3"/>
+            <a:endCxn id="4" idx="2"/>
+          </p:cNvCxnSpPr>
+          <p:nvPr/>
+        </p:nvCxnSpPr>
+        <p:spPr>
+          <a:xfrm flipV="1">
+            <a:off x="2438400" y="457200"/>
+            <a:ext cx="1143000" cy="2628900"/>
+          </a:xfrm>
+          <a:prstGeom prst="bentConnector3">
+            <a:avLst>
+              <a:gd name="adj1" fmla="val 50000"/>
+            </a:avLst>
+          </a:prstGeom>
+          <a:ln>
+            <a:tailEnd type="arrow"/>
+          </a:ln>
+        </p:spPr>
+        <p:style>
+          <a:lnRef idx="1">
+            <a:schemeClr val="accent1"/>
+          </a:lnRef>
+          <a:fillRef idx="0">
+            <a:schemeClr val="accent1"/>
+          </a:fillRef>
+          <a:effectRef idx="0">
+            <a:schemeClr val="accent1"/>
+          </a:effectRef>
+          <a:fontRef idx="minor">
+            <a:schemeClr val="tx1"/>
+          </a:fontRef>
+        </p:style>
+      </p:cxnSp>
+      <p:sp>
+        <p:nvSpPr>
+          <p:cNvPr id="22" name="Rounded Rectangle 21"/>
+          <p:cNvSpPr/>
           <p:nvPr/>
         </p:nvSpPr>
         <p:spPr>
           <a:xfrm>
-            <a:off x="609600" y="2286000"/>
-            <a:ext cx="1600200" cy="646331"/>
+            <a:off x="7467600" y="1143000"/>
+            <a:ext cx="1371600" cy="838200"/>
           </a:xfrm>
-          <a:prstGeom prst="rect">
+          <a:prstGeom prst="roundRect">
             <a:avLst/>
           </a:prstGeom>
-          <a:noFill/>
+          <a:solidFill>
+            <a:schemeClr val="accent2"/>
+          </a:solidFill>
+          <a:ln>
+            <a:solidFill>
+              <a:schemeClr val="tx1"/>
+            </a:solidFill>
+          </a:ln>
         </p:spPr>
-        <p:txBody>
-          <a:bodyPr wrap="square" rtlCol="0">
-            <a:spAutoFit/>
-          </a:bodyPr>
-          <a:lstStyle/>
-          <a:p>
+        <p:style>
+          <a:lnRef idx="2">
+            <a:schemeClr val="accent1">
+              <a:shade val="50000"/>
+            </a:schemeClr>
+          </a:lnRef>
+          <a:fillRef idx="1">
+            <a:schemeClr val="accent1"/>
+          </a:fillRef>
+          <a:effectRef idx="0">
+            <a:schemeClr val="accent1"/>
+          </a:effectRef>
+          <a:fontRef idx="minor">
+            <a:schemeClr val="lt1"/>
+          </a:fontRef>
+        </p:style>
+        <p:txBody>
+          <a:bodyPr rtlCol="0" anchor="ctr"/>
+          <a:lstStyle/>
+          <a:p>
+            <a:pPr algn="ctr"/>
             <a:r>
               <a:rPr lang="en-US" dirty="0" smtClean="0"/>
-              <a:t>Generates course groups</a:t>
+              <a:t>Final DB</a:t>
             </a:r>
             <a:endParaRPr lang="en-US" dirty="0"/>
           </a:p>
         </p:txBody>
       </p:sp>
-      <p:sp>
-        <p:nvSpPr>
-          <p:cNvPr id="16" name="TextBox 15"/>
-          <p:cNvSpPr txBox="1"/>
+      <p:cxnSp>
+        <p:nvCxnSpPr>
+          <p:cNvPr id="25" name="Shape 24"/>
+          <p:cNvCxnSpPr>
+            <a:stCxn id="4" idx="6"/>
+            <a:endCxn id="22" idx="0"/>
+          </p:cNvCxnSpPr>
           <p:nvPr/>
-        </p:nvSpPr>
+        </p:nvCxnSpPr>
         <p:spPr>
           <a:xfrm>
-            <a:off x="3962400" y="2438400"/>
-            <a:ext cx="1600200" cy="1477328"/>
+            <a:off x="5257800" y="457200"/>
+            <a:ext cx="2895600" cy="685800"/>
           </a:xfrm>
-          <a:prstGeom prst="rect">
+          <a:prstGeom prst="bentConnector2">
             <a:avLst/>
           </a:prstGeom>
-          <a:noFill/>
+          <a:ln>
+            <a:tailEnd type="arrow"/>
+          </a:ln>
         </p:spPr>
-        <p:txBody>
-          <a:bodyPr wrap="square" rtlCol="0">
-            <a:spAutoFit/>
-          </a:bodyPr>
-          <a:lstStyle/>
-          <a:p>
-            <a:r>
-              <a:rPr lang="en-US" dirty="0" smtClean="0"/>
-              <a:t>Generates Individual Courses &amp; High Level Course details</a:t>
-            </a:r>
-          </a:p>
-        </p:txBody>
-      </p:sp>
-      <p:sp>
-        <p:nvSpPr>
-          <p:cNvPr id="20" name="TextBox 19"/>
-          <p:cNvSpPr txBox="1"/>
+        <p:style>
+          <a:lnRef idx="1">
+            <a:schemeClr val="accent1"/>
+          </a:lnRef>
+          <a:fillRef idx="0">
+            <a:schemeClr val="accent1"/>
+          </a:fillRef>
+          <a:effectRef idx="0">
+            <a:schemeClr val="accent1"/>
+          </a:effectRef>
+          <a:fontRef idx="minor">
+            <a:schemeClr val="tx1"/>
+          </a:fontRef>
+        </p:style>
+      </p:cxnSp>
+      <p:sp>
+        <p:nvSpPr>
+          <p:cNvPr id="23" name="Rounded Rectangle 22"/>
+          <p:cNvSpPr/>
           <p:nvPr/>
         </p:nvSpPr>
         <p:spPr>
           <a:xfrm>
-            <a:off x="533400" y="5144869"/>
-            <a:ext cx="1828800" cy="1200329"/>
-          </a:xfrm>
-          <a:prstGeom prst="rect">
-            <a:avLst/>
-          </a:prstGeom>
-          <a:noFill/>
-        </p:spPr>
-        <p:txBody>
-          <a:bodyPr wrap="square" rtlCol="0">
-            <a:spAutoFit/>
-          </a:bodyPr>
-          <a:lstStyle/>
-          <a:p>
-            <a:r>
-              <a:rPr lang="en-US" dirty="0" smtClean="0"/>
-              <a:t>Submits constraints and course requirements</a:t>
-            </a:r>
-            <a:endParaRPr lang="en-US" dirty="0"/>
-          </a:p>
-        </p:txBody>
-      </p:sp>
-      <p:sp>
-        <p:nvSpPr>
-          <p:cNvPr id="25" name="Rounded Rectangle 24"/>
-          <p:cNvSpPr/>
-          <p:nvPr/>
-        </p:nvSpPr>
-        <p:spPr>
-          <a:xfrm rot="16200000">
-            <a:off x="914401" y="3124201"/>
-            <a:ext cx="4953000" cy="533400"/>
+            <a:off x="5486400" y="152400"/>
+            <a:ext cx="1752600" cy="609600"/>
           </a:xfrm>
           <a:prstGeom prst="roundRect">
             <a:avLst/>
@@ -3317,27 +3806,60 @@
           <a:p>
             <a:pPr algn="ctr"/>
             <a:r>
-              <a:rPr lang="en-US" b="1" dirty="0" err="1" smtClean="0"/>
-              <a:t>MyCourses</a:t>
-            </a:r>
-            <a:r>
-              <a:rPr lang="en-US" b="1" dirty="0" smtClean="0"/>
-              <a:t> System</a:t>
-            </a:r>
-            <a:endParaRPr lang="en-US" b="1" dirty="0"/>
-          </a:p>
-        </p:txBody>
-      </p:sp>
-      <p:sp>
-        <p:nvSpPr>
-          <p:cNvPr id="106" name="Rounded Rectangle 105"/>
+              <a:rPr lang="en-US" dirty="0" smtClean="0"/>
+              <a:t>Runs Algorithm</a:t>
+            </a:r>
+          </a:p>
+        </p:txBody>
+      </p:sp>
+      <p:cxnSp>
+        <p:nvCxnSpPr>
+          <p:cNvPr id="28" name="Elbow Connector 27"/>
+          <p:cNvCxnSpPr>
+            <a:stCxn id="7" idx="0"/>
+            <a:endCxn id="22" idx="2"/>
+          </p:cNvCxnSpPr>
+          <p:nvPr/>
+        </p:nvCxnSpPr>
+        <p:spPr>
+          <a:xfrm rot="5400000" flipH="1" flipV="1">
+            <a:off x="7429500" y="2705100"/>
+            <a:ext cx="1447800" cy="1588"/>
+          </a:xfrm>
+          <a:prstGeom prst="bentConnector3">
+            <a:avLst>
+              <a:gd name="adj1" fmla="val 50000"/>
+            </a:avLst>
+          </a:prstGeom>
+          <a:ln>
+            <a:tailEnd type="arrow"/>
+          </a:ln>
+        </p:spPr>
+        <p:style>
+          <a:lnRef idx="1">
+            <a:schemeClr val="accent1"/>
+          </a:lnRef>
+          <a:fillRef idx="0">
+            <a:schemeClr val="accent1"/>
+          </a:fillRef>
+          <a:effectRef idx="0">
+            <a:schemeClr val="accent1"/>
+          </a:effectRef>
+          <a:fontRef idx="minor">
+            <a:schemeClr val="tx1"/>
+          </a:fontRef>
+        </p:style>
+      </p:cxnSp>
+      <p:sp>
+        <p:nvSpPr>
+          <p:cNvPr id="26" name="Rounded Rectangle 25"/>
           <p:cNvSpPr/>
           <p:nvPr/>
         </p:nvSpPr>
         <p:spPr>
           <a:xfrm>
-            <a:off x="4114800" y="4267200"/>
-            <a:ext cx="1219200" cy="1066800"/>
+            <a:off x="7239000" y="2743200"/>
+            <a:ext cx="1752600" cy="609600"/>
           </a:xfrm>
           <a:prstGeom prst="roundRect">
             <a:avLst/>
@@ -3366,24 +3888,23 @@
             <a:pPr algn="ctr"/>
             <a:r>
               <a:rPr lang="en-US" dirty="0" smtClean="0"/>
-              <a:t>Lecturers</a:t>
-            </a:r>
-            <a:endParaRPr lang="en-US" dirty="0"/>
-          </a:p>
-        </p:txBody>
-      </p:sp>
-      <p:sp>
-        <p:nvSpPr>
-          <p:cNvPr id="107" name="Rounded Rectangle 106"/>
+              <a:t>Signs up for courses</a:t>
+            </a:r>
+          </a:p>
+        </p:txBody>
+      </p:sp>
+      <p:sp>
+        <p:nvSpPr>
+          <p:cNvPr id="29" name="Rectangle 28"/>
           <p:cNvSpPr/>
           <p:nvPr/>
         </p:nvSpPr>
         <p:spPr>
-          <a:xfrm rot="16200000">
-            <a:off x="4267200" y="3124200"/>
-            <a:ext cx="4953000" cy="533400"/>
+          <a:xfrm>
+            <a:off x="1905000" y="5638800"/>
+            <a:ext cx="5715000" cy="762000"/>
           </a:xfrm>
-          <a:prstGeom prst="roundRect">
+          <a:prstGeom prst="rect">
             <a:avLst/>
           </a:prstGeom>
         </p:spPr>
@@ -3410,312 +3931,12 @@
             <a:pPr algn="ctr"/>
             <a:r>
               <a:rPr lang="en-US" b="1" dirty="0" smtClean="0"/>
-              <a:t>Courses</a:t>
+              <a:t>Final Flow chart</a:t>
             </a:r>
             <a:endParaRPr lang="en-US" b="1" dirty="0"/>
           </a:p>
         </p:txBody>
       </p:sp>
-      <p:sp>
-        <p:nvSpPr>
-          <p:cNvPr id="133" name="TextBox 132"/>
-          <p:cNvSpPr txBox="1"/>
-          <p:nvPr/>
-        </p:nvSpPr>
-        <p:spPr>
-          <a:xfrm>
-            <a:off x="4038600" y="5562600"/>
-            <a:ext cx="1371600" cy="923330"/>
-          </a:xfrm>
-          <a:prstGeom prst="rect">
-            <a:avLst/>
-          </a:prstGeom>
-          <a:noFill/>
-        </p:spPr>
-        <p:txBody>
-          <a:bodyPr wrap="square" rtlCol="0">
-            <a:spAutoFit/>
-          </a:bodyPr>
-          <a:lstStyle/>
-          <a:p>
-            <a:r>
-              <a:rPr lang="en-US" dirty="0" smtClean="0"/>
-              <a:t>Enters course details</a:t>
-            </a:r>
-            <a:endParaRPr lang="en-US" dirty="0"/>
-          </a:p>
-        </p:txBody>
-      </p:sp>
-      <p:cxnSp>
-        <p:nvCxnSpPr>
-          <p:cNvPr id="135" name="Shape 134"/>
-          <p:cNvCxnSpPr>
-            <a:stCxn id="4" idx="3"/>
-            <a:endCxn id="25" idx="0"/>
-          </p:cNvCxnSpPr>
-          <p:nvPr/>
-        </p:nvCxnSpPr>
-        <p:spPr>
-          <a:xfrm>
-            <a:off x="2133600" y="1447800"/>
-            <a:ext cx="990601" cy="1943101"/>
-          </a:xfrm>
-          <a:prstGeom prst="bentConnector5">
-            <a:avLst>
-              <a:gd name="adj1" fmla="val 23077"/>
-              <a:gd name="adj2" fmla="val 56863"/>
-              <a:gd name="adj3" fmla="val 76923"/>
-            </a:avLst>
-          </a:prstGeom>
-          <a:ln>
-            <a:tailEnd type="arrow"/>
-          </a:ln>
-        </p:spPr>
-        <p:style>
-          <a:lnRef idx="1">
-            <a:schemeClr val="accent1"/>
-          </a:lnRef>
-          <a:fillRef idx="0">
-            <a:schemeClr val="accent1"/>
-          </a:fillRef>
-          <a:effectRef idx="0">
-            <a:schemeClr val="accent1"/>
-          </a:effectRef>
-          <a:fontRef idx="minor">
-            <a:schemeClr val="tx1"/>
-          </a:fontRef>
-        </p:style>
-      </p:cxnSp>
-      <p:cxnSp>
-        <p:nvCxnSpPr>
-          <p:cNvPr id="137" name="Shape 136"/>
-          <p:cNvCxnSpPr>
-            <a:stCxn id="8" idx="3"/>
-            <a:endCxn id="25" idx="0"/>
-          </p:cNvCxnSpPr>
-          <p:nvPr/>
-        </p:nvCxnSpPr>
-        <p:spPr>
-          <a:xfrm flipV="1">
-            <a:off x="2133600" y="3390901"/>
-            <a:ext cx="990601" cy="1104899"/>
-          </a:xfrm>
-          <a:prstGeom prst="bentConnector5">
-            <a:avLst>
-              <a:gd name="adj1" fmla="val 23077"/>
-              <a:gd name="adj2" fmla="val 62069"/>
-              <a:gd name="adj3" fmla="val 76923"/>
-            </a:avLst>
-          </a:prstGeom>
-          <a:ln>
-            <a:tailEnd type="arrow"/>
-          </a:ln>
-        </p:spPr>
-        <p:style>
-          <a:lnRef idx="1">
-            <a:schemeClr val="accent1"/>
-          </a:lnRef>
-          <a:fillRef idx="0">
-            <a:schemeClr val="accent1"/>
-          </a:fillRef>
-          <a:effectRef idx="0">
-            <a:schemeClr val="accent1"/>
-          </a:effectRef>
-          <a:fontRef idx="minor">
-            <a:schemeClr val="tx1"/>
-          </a:fontRef>
-        </p:style>
-      </p:cxnSp>
-      <p:cxnSp>
-        <p:nvCxnSpPr>
-          <p:cNvPr id="139" name="Shape 138"/>
-          <p:cNvCxnSpPr>
-            <a:stCxn id="7" idx="3"/>
-            <a:endCxn id="107" idx="0"/>
-          </p:cNvCxnSpPr>
-          <p:nvPr/>
-        </p:nvCxnSpPr>
-        <p:spPr>
-          <a:xfrm>
-            <a:off x="5334000" y="1524000"/>
-            <a:ext cx="1143000" cy="1866900"/>
-          </a:xfrm>
-          <a:prstGeom prst="bentConnector5">
-            <a:avLst>
-              <a:gd name="adj1" fmla="val 20000"/>
-              <a:gd name="adj2" fmla="val 57143"/>
-              <a:gd name="adj3" fmla="val 80000"/>
-            </a:avLst>
-          </a:prstGeom>
-          <a:ln>
-            <a:tailEnd type="arrow"/>
-          </a:ln>
-        </p:spPr>
-        <p:style>
-          <a:lnRef idx="1">
-            <a:schemeClr val="accent1"/>
-          </a:lnRef>
-          <a:fillRef idx="0">
-            <a:schemeClr val="accent1"/>
-          </a:fillRef>
-          <a:effectRef idx="0">
-            <a:schemeClr val="accent1"/>
-          </a:effectRef>
-          <a:fontRef idx="minor">
-            <a:schemeClr val="tx1"/>
-          </a:fontRef>
-        </p:style>
-      </p:cxnSp>
-      <p:cxnSp>
-        <p:nvCxnSpPr>
-          <p:cNvPr id="141" name="Elbow Connector 140"/>
-          <p:cNvCxnSpPr>
-            <a:stCxn id="106" idx="3"/>
-            <a:endCxn id="107" idx="0"/>
-          </p:cNvCxnSpPr>
-          <p:nvPr/>
-        </p:nvCxnSpPr>
-        <p:spPr>
-          <a:xfrm flipV="1">
-            <a:off x="5334000" y="3390900"/>
-            <a:ext cx="1143000" cy="1409700"/>
-          </a:xfrm>
-          <a:prstGeom prst="bentConnector5">
-            <a:avLst>
-              <a:gd name="adj1" fmla="val 20000"/>
-              <a:gd name="adj2" fmla="val 99215"/>
-              <a:gd name="adj3" fmla="val 80000"/>
-            </a:avLst>
-          </a:prstGeom>
-          <a:ln>
-            <a:tailEnd type="arrow"/>
-          </a:ln>
-        </p:spPr>
-        <p:style>
-          <a:lnRef idx="1">
-            <a:schemeClr val="accent1"/>
-          </a:lnRef>
-          <a:fillRef idx="0">
-            <a:schemeClr val="accent1"/>
-          </a:fillRef>
-          <a:effectRef idx="0">
-            <a:schemeClr val="accent1"/>
-          </a:effectRef>
-          <a:fontRef idx="minor">
-            <a:schemeClr val="tx1"/>
-          </a:fontRef>
-        </p:style>
-      </p:cxnSp>
-      <p:sp>
-        <p:nvSpPr>
-          <p:cNvPr id="148" name="Rounded Rectangle 147"/>
-          <p:cNvSpPr/>
-          <p:nvPr/>
-        </p:nvSpPr>
-        <p:spPr>
-          <a:xfrm>
-            <a:off x="7620000" y="2895600"/>
-            <a:ext cx="1219200" cy="1066800"/>
-          </a:xfrm>
-          <a:prstGeom prst="roundRect">
-            <a:avLst/>
-          </a:prstGeom>
-        </p:spPr>
-        <p:style>
-          <a:lnRef idx="2">
-            <a:schemeClr val="accent1">
-              <a:shade val="50000"/>
-            </a:schemeClr>
-          </a:lnRef>
-          <a:fillRef idx="1">
-            <a:schemeClr val="accent1"/>
-          </a:fillRef>
-          <a:effectRef idx="0">
-            <a:schemeClr val="accent1"/>
-          </a:effectRef>
-          <a:fontRef idx="minor">
-            <a:schemeClr val="lt1"/>
-          </a:fontRef>
-        </p:style>
-        <p:txBody>
-          <a:bodyPr rtlCol="0" anchor="ctr"/>
-          <a:lstStyle/>
-          <a:p>
-            <a:pPr algn="ctr"/>
-            <a:r>
-              <a:rPr lang="en-US" dirty="0" smtClean="0"/>
-              <a:t>Student</a:t>
-            </a:r>
-            <a:endParaRPr lang="en-US" dirty="0"/>
-          </a:p>
-        </p:txBody>
-      </p:sp>
-      <p:sp>
-        <p:nvSpPr>
-          <p:cNvPr id="149" name="TextBox 148"/>
-          <p:cNvSpPr txBox="1"/>
-          <p:nvPr/>
-        </p:nvSpPr>
-        <p:spPr>
-          <a:xfrm>
-            <a:off x="7543801" y="4267200"/>
-            <a:ext cx="1295399" cy="646331"/>
-          </a:xfrm>
-          <a:prstGeom prst="rect">
-            <a:avLst/>
-          </a:prstGeom>
-          <a:noFill/>
-        </p:spPr>
-        <p:txBody>
-          <a:bodyPr wrap="square" rtlCol="0">
-            <a:spAutoFit/>
-          </a:bodyPr>
-          <a:lstStyle/>
-          <a:p>
-            <a:r>
-              <a:rPr lang="en-US" dirty="0" smtClean="0"/>
-              <a:t>Signs up for courses</a:t>
-            </a:r>
-            <a:endParaRPr lang="en-US" dirty="0"/>
-          </a:p>
-        </p:txBody>
-      </p:sp>
-      <p:cxnSp>
-        <p:nvCxnSpPr>
-          <p:cNvPr id="158" name="Straight Arrow Connector 157"/>
-          <p:cNvCxnSpPr>
-            <a:stCxn id="107" idx="2"/>
-            <a:endCxn id="148" idx="1"/>
-          </p:cNvCxnSpPr>
-          <p:nvPr/>
-        </p:nvCxnSpPr>
-        <p:spPr>
-          <a:xfrm>
-            <a:off x="7010400" y="3390900"/>
-            <a:ext cx="609600" cy="38100"/>
-          </a:xfrm>
-          <a:prstGeom prst="straightConnector1">
-            <a:avLst/>
-          </a:prstGeom>
-          <a:ln>
-            <a:tailEnd type="arrow"/>
-          </a:ln>
-        </p:spPr>
-        <p:style>
-          <a:lnRef idx="1">
-            <a:schemeClr val="accent1"/>
-          </a:lnRef>
-          <a:fillRef idx="0">
-            <a:schemeClr val="accent1"/>
-          </a:fillRef>
-          <a:effectRef idx="0">
-            <a:schemeClr val="accent1"/>
-          </a:effectRef>
-          <a:fontRef idx="minor">
-            <a:schemeClr val="tx1"/>
-          </a:fontRef>
-        </p:style>
-      </p:cxnSp>
     </p:spTree>
   </p:cSld>
   <p:clrMapOvr>

</xml_diff>